<commit_message>
added updated prez :q
</commit_message>
<xml_diff>
--- a/Presentation.pptx
+++ b/Presentation.pptx
@@ -12,7 +12,8 @@
     <p:sldId id="263" r:id="rId6"/>
     <p:sldId id="260" r:id="rId7"/>
     <p:sldId id="261" r:id="rId8"/>
-    <p:sldId id="262" r:id="rId9"/>
+    <p:sldId id="264" r:id="rId9"/>
+    <p:sldId id="262" r:id="rId10"/>
   </p:sldIdLst>
   <p:sldSz cx="12192000" cy="6858000"/>
   <p:notesSz cx="6858000" cy="9144000"/>
@@ -111,6 +112,11 @@
       </a:defRPr>
     </a:lvl9pPr>
   </p:defaultTextStyle>
+  <p:extLst>
+    <p:ext uri="{EFAFB233-063F-42B5-8137-9DF3F51BA10A}">
+      <p15:sldGuideLst xmlns:p15="http://schemas.microsoft.com/office/powerpoint/2012/main"/>
+    </p:ext>
+  </p:extLst>
 </p:presentation>
 </file>
 
@@ -386,11 +392,11 @@
         </c:dLbls>
         <c:gapWidth val="219"/>
         <c:overlap val="-27"/>
-        <c:axId val="-1478465136"/>
-        <c:axId val="-1478620544"/>
+        <c:axId val="-1482387296"/>
+        <c:axId val="-1482469968"/>
       </c:barChart>
       <c:catAx>
-        <c:axId val="-1478465136"/>
+        <c:axId val="-1482387296"/>
         <c:scaling>
           <c:orientation val="minMax"/>
         </c:scaling>
@@ -433,7 +439,7 @@
             <a:endParaRPr lang="en-US"/>
           </a:p>
         </c:txPr>
-        <c:crossAx val="-1478620544"/>
+        <c:crossAx val="-1482469968"/>
         <c:crosses val="autoZero"/>
         <c:auto val="1"/>
         <c:lblAlgn val="ctr"/>
@@ -441,7 +447,7 @@
         <c:noMultiLvlLbl val="0"/>
       </c:catAx>
       <c:valAx>
-        <c:axId val="-1478620544"/>
+        <c:axId val="-1482469968"/>
         <c:scaling>
           <c:orientation val="minMax"/>
         </c:scaling>
@@ -492,7 +498,7 @@
             <a:endParaRPr lang="en-US"/>
           </a:p>
         </c:txPr>
-        <c:crossAx val="-1478465136"/>
+        <c:crossAx val="-1482387296"/>
         <c:crosses val="autoZero"/>
         <c:crossBetween val="between"/>
       </c:valAx>
@@ -880,11 +886,11 @@
           <c:showBubbleSize val="0"/>
         </c:dLbls>
         <c:gapWidth val="182"/>
-        <c:axId val="-1432948592"/>
-        <c:axId val="-1432946272"/>
+        <c:axId val="-1480025584"/>
+        <c:axId val="-1480042544"/>
       </c:barChart>
       <c:catAx>
-        <c:axId val="-1432948592"/>
+        <c:axId val="-1480025584"/>
         <c:scaling>
           <c:orientation val="minMax"/>
         </c:scaling>
@@ -927,7 +933,7 @@
             <a:endParaRPr lang="en-US"/>
           </a:p>
         </c:txPr>
-        <c:crossAx val="-1432946272"/>
+        <c:crossAx val="-1480042544"/>
         <c:crosses val="autoZero"/>
         <c:auto val="1"/>
         <c:lblAlgn val="ctr"/>
@@ -935,7 +941,7 @@
         <c:noMultiLvlLbl val="0"/>
       </c:catAx>
       <c:valAx>
-        <c:axId val="-1432946272"/>
+        <c:axId val="-1480042544"/>
         <c:scaling>
           <c:orientation val="minMax"/>
         </c:scaling>
@@ -985,10 +991,301 @@
             <a:endParaRPr lang="en-US"/>
           </a:p>
         </c:txPr>
-        <c:crossAx val="-1432948592"/>
+        <c:crossAx val="-1480025584"/>
         <c:crosses val="autoZero"/>
         <c:crossBetween val="between"/>
       </c:valAx>
+      <c:spPr>
+        <a:noFill/>
+        <a:ln>
+          <a:noFill/>
+        </a:ln>
+        <a:effectLst/>
+      </c:spPr>
+    </c:plotArea>
+    <c:legend>
+      <c:legendPos val="b"/>
+      <c:layout/>
+      <c:overlay val="0"/>
+      <c:spPr>
+        <a:noFill/>
+        <a:ln>
+          <a:noFill/>
+        </a:ln>
+        <a:effectLst/>
+      </c:spPr>
+      <c:txPr>
+        <a:bodyPr rot="0" spcFirstLastPara="1" vertOverflow="ellipsis" vert="horz" wrap="square" anchor="ctr" anchorCtr="1"/>
+        <a:lstStyle/>
+        <a:p>
+          <a:pPr>
+            <a:defRPr sz="1197" b="0" i="0" u="none" strike="noStrike" kern="1200" baseline="0">
+              <a:solidFill>
+                <a:schemeClr val="tx1">
+                  <a:lumMod val="65000"/>
+                  <a:lumOff val="35000"/>
+                </a:schemeClr>
+              </a:solidFill>
+              <a:latin typeface="+mn-lt"/>
+              <a:ea typeface="+mn-ea"/>
+              <a:cs typeface="+mn-cs"/>
+            </a:defRPr>
+          </a:pPr>
+          <a:endParaRPr lang="en-US"/>
+        </a:p>
+      </c:txPr>
+    </c:legend>
+    <c:plotVisOnly val="1"/>
+    <c:dispBlanksAs val="gap"/>
+    <c:showDLblsOverMax val="0"/>
+  </c:chart>
+  <c:spPr>
+    <a:noFill/>
+    <a:ln>
+      <a:noFill/>
+    </a:ln>
+    <a:effectLst/>
+  </c:spPr>
+  <c:txPr>
+    <a:bodyPr/>
+    <a:lstStyle/>
+    <a:p>
+      <a:pPr>
+        <a:defRPr/>
+      </a:pPr>
+      <a:endParaRPr lang="en-US"/>
+    </a:p>
+  </c:txPr>
+  <c:externalData r:id="rId3">
+    <c:autoUpdate val="0"/>
+  </c:externalData>
+</c:chartSpace>
+</file>
+
+<file path=ppt/charts/chart3.xml><?xml version="1.0" encoding="utf-8"?>
+<c:chartSpace xmlns:c="http://schemas.openxmlformats.org/drawingml/2006/chart" xmlns:a="http://schemas.openxmlformats.org/drawingml/2006/main" xmlns:r="http://schemas.openxmlformats.org/officeDocument/2006/relationships">
+  <c:date1904 val="0"/>
+  <c:lang val="en-US"/>
+  <c:roundedCorners val="0"/>
+  <mc:AlternateContent xmlns:mc="http://schemas.openxmlformats.org/markup-compatibility/2006">
+    <mc:Choice xmlns:c14="http://schemas.microsoft.com/office/drawing/2007/8/2/chart" Requires="c14">
+      <c14:style val="102"/>
+    </mc:Choice>
+    <mc:Fallback>
+      <c:style val="2"/>
+    </mc:Fallback>
+  </mc:AlternateContent>
+  <c:chart>
+    <c:title>
+      <c:tx>
+        <c:rich>
+          <a:bodyPr rot="0" spcFirstLastPara="1" vertOverflow="ellipsis" vert="horz" wrap="square" anchor="ctr" anchorCtr="1"/>
+          <a:lstStyle/>
+          <a:p>
+            <a:pPr>
+              <a:defRPr sz="1862" b="0" i="0" u="none" strike="noStrike" kern="1200" spc="0" baseline="0">
+                <a:solidFill>
+                  <a:schemeClr val="tx1">
+                    <a:lumMod val="65000"/>
+                    <a:lumOff val="35000"/>
+                  </a:schemeClr>
+                </a:solidFill>
+                <a:latin typeface="+mn-lt"/>
+                <a:ea typeface="+mn-ea"/>
+                <a:cs typeface="+mn-cs"/>
+              </a:defRPr>
+            </a:pPr>
+            <a:r>
+              <a:rPr lang="en-US" dirty="0" smtClean="0"/>
+              <a:t>Number of Tests</a:t>
+            </a:r>
+            <a:endParaRPr lang="en-US" dirty="0"/>
+          </a:p>
+        </c:rich>
+      </c:tx>
+      <c:layout/>
+      <c:overlay val="0"/>
+      <c:spPr>
+        <a:noFill/>
+        <a:ln>
+          <a:noFill/>
+        </a:ln>
+        <a:effectLst/>
+      </c:spPr>
+      <c:txPr>
+        <a:bodyPr rot="0" spcFirstLastPara="1" vertOverflow="ellipsis" vert="horz" wrap="square" anchor="ctr" anchorCtr="1"/>
+        <a:lstStyle/>
+        <a:p>
+          <a:pPr>
+            <a:defRPr sz="1862" b="0" i="0" u="none" strike="noStrike" kern="1200" spc="0" baseline="0">
+              <a:solidFill>
+                <a:schemeClr val="tx1">
+                  <a:lumMod val="65000"/>
+                  <a:lumOff val="35000"/>
+                </a:schemeClr>
+              </a:solidFill>
+              <a:latin typeface="+mn-lt"/>
+              <a:ea typeface="+mn-ea"/>
+              <a:cs typeface="+mn-cs"/>
+            </a:defRPr>
+          </a:pPr>
+          <a:endParaRPr lang="en-US"/>
+        </a:p>
+      </c:txPr>
+    </c:title>
+    <c:autoTitleDeleted val="0"/>
+    <c:plotArea>
+      <c:layout/>
+      <c:pieChart>
+        <c:varyColors val="1"/>
+        <c:ser>
+          <c:idx val="0"/>
+          <c:order val="0"/>
+          <c:tx>
+            <c:strRef>
+              <c:f>Sheet1!$B$1</c:f>
+              <c:strCache>
+                <c:ptCount val="1"/>
+                <c:pt idx="0">
+                  <c:v>Sales</c:v>
+                </c:pt>
+              </c:strCache>
+            </c:strRef>
+          </c:tx>
+          <c:dPt>
+            <c:idx val="0"/>
+            <c:bubble3D val="0"/>
+            <c:spPr>
+              <a:solidFill>
+                <a:schemeClr val="accent1"/>
+              </a:solidFill>
+              <a:ln w="19050">
+                <a:solidFill>
+                  <a:schemeClr val="lt1"/>
+                </a:solidFill>
+              </a:ln>
+              <a:effectLst/>
+            </c:spPr>
+          </c:dPt>
+          <c:dPt>
+            <c:idx val="1"/>
+            <c:bubble3D val="0"/>
+            <c:spPr>
+              <a:solidFill>
+                <a:schemeClr val="accent2"/>
+              </a:solidFill>
+              <a:ln w="19050">
+                <a:solidFill>
+                  <a:schemeClr val="lt1"/>
+                </a:solidFill>
+              </a:ln>
+              <a:effectLst/>
+            </c:spPr>
+          </c:dPt>
+          <c:dPt>
+            <c:idx val="2"/>
+            <c:bubble3D val="0"/>
+            <c:spPr>
+              <a:solidFill>
+                <a:schemeClr val="accent3"/>
+              </a:solidFill>
+              <a:ln w="19050">
+                <a:solidFill>
+                  <a:schemeClr val="lt1"/>
+                </a:solidFill>
+              </a:ln>
+              <a:effectLst/>
+            </c:spPr>
+          </c:dPt>
+          <c:dPt>
+            <c:idx val="3"/>
+            <c:bubble3D val="0"/>
+            <c:spPr>
+              <a:solidFill>
+                <a:schemeClr val="accent4"/>
+              </a:solidFill>
+              <a:ln w="19050">
+                <a:solidFill>
+                  <a:schemeClr val="lt1"/>
+                </a:solidFill>
+              </a:ln>
+              <a:effectLst/>
+            </c:spPr>
+          </c:dPt>
+          <c:dPt>
+            <c:idx val="4"/>
+            <c:bubble3D val="0"/>
+            <c:spPr>
+              <a:solidFill>
+                <a:schemeClr val="accent5"/>
+              </a:solidFill>
+              <a:ln w="19050">
+                <a:solidFill>
+                  <a:schemeClr val="lt1"/>
+                </a:solidFill>
+              </a:ln>
+              <a:effectLst/>
+            </c:spPr>
+          </c:dPt>
+          <c:cat>
+            <c:strRef>
+              <c:f>Sheet1!$A$2:$A$6</c:f>
+              <c:strCache>
+                <c:ptCount val="5"/>
+                <c:pt idx="0">
+                  <c:v>Kieran</c:v>
+                </c:pt>
+                <c:pt idx="1">
+                  <c:v>Eryn</c:v>
+                </c:pt>
+                <c:pt idx="2">
+                  <c:v>Sarah</c:v>
+                </c:pt>
+                <c:pt idx="3">
+                  <c:v>Peyton</c:v>
+                </c:pt>
+                <c:pt idx="4">
+                  <c:v>Apurva</c:v>
+                </c:pt>
+              </c:strCache>
+            </c:strRef>
+          </c:cat>
+          <c:val>
+            <c:numRef>
+              <c:f>Sheet1!$B$2:$B$6</c:f>
+              <c:numCache>
+                <c:formatCode>General</c:formatCode>
+                <c:ptCount val="5"/>
+                <c:pt idx="0">
+                  <c:v>10.0</c:v>
+                </c:pt>
+                <c:pt idx="1">
+                  <c:v>0.0</c:v>
+                </c:pt>
+                <c:pt idx="2">
+                  <c:v>0.0</c:v>
+                </c:pt>
+                <c:pt idx="3">
+                  <c:v>0.0</c:v>
+                </c:pt>
+                <c:pt idx="4">
+                  <c:v>0.0</c:v>
+                </c:pt>
+              </c:numCache>
+            </c:numRef>
+          </c:val>
+        </c:ser>
+        <c:dLbls>
+          <c:showLegendKey val="0"/>
+          <c:showVal val="0"/>
+          <c:showCatName val="0"/>
+          <c:showSerName val="0"/>
+          <c:showPercent val="0"/>
+          <c:showBubbleSize val="0"/>
+          <c:showLeaderLines val="1"/>
+        </c:dLbls>
+        <c:firstSliceAng val="0"/>
+      </c:pieChart>
       <c:spPr>
         <a:noFill/>
         <a:ln>
@@ -1097,6 +1394,46 @@
 </file>
 
 <file path=ppt/charts/colors2.xml><?xml version="1.0" encoding="utf-8"?>
+<cs:colorStyle xmlns:cs="http://schemas.microsoft.com/office/drawing/2012/chartStyle" xmlns:a="http://schemas.openxmlformats.org/drawingml/2006/main" meth="cycle" id="10">
+  <a:schemeClr val="accent1"/>
+  <a:schemeClr val="accent2"/>
+  <a:schemeClr val="accent3"/>
+  <a:schemeClr val="accent4"/>
+  <a:schemeClr val="accent5"/>
+  <a:schemeClr val="accent6"/>
+  <cs:variation/>
+  <cs:variation>
+    <a:lumMod val="60000"/>
+  </cs:variation>
+  <cs:variation>
+    <a:lumMod val="80000"/>
+    <a:lumOff val="20000"/>
+  </cs:variation>
+  <cs:variation>
+    <a:lumMod val="80000"/>
+  </cs:variation>
+  <cs:variation>
+    <a:lumMod val="60000"/>
+    <a:lumOff val="40000"/>
+  </cs:variation>
+  <cs:variation>
+    <a:lumMod val="50000"/>
+  </cs:variation>
+  <cs:variation>
+    <a:lumMod val="70000"/>
+    <a:lumOff val="30000"/>
+  </cs:variation>
+  <cs:variation>
+    <a:lumMod val="70000"/>
+  </cs:variation>
+  <cs:variation>
+    <a:lumMod val="50000"/>
+    <a:lumOff val="50000"/>
+  </cs:variation>
+</cs:colorStyle>
+</file>
+
+<file path=ppt/charts/colors3.xml><?xml version="1.0" encoding="utf-8"?>
 <cs:colorStyle xmlns:cs="http://schemas.microsoft.com/office/drawing/2012/chartStyle" xmlns:a="http://schemas.openxmlformats.org/drawingml/2006/main" meth="cycle" id="10">
   <a:schemeClr val="accent1"/>
   <a:schemeClr val="accent2"/>
@@ -2144,6 +2481,525 @@
 </cs:chartStyle>
 </file>
 
+<file path=ppt/charts/style3.xml><?xml version="1.0" encoding="utf-8"?>
+<cs:chartStyle xmlns:cs="http://schemas.microsoft.com/office/drawing/2012/chartStyle" xmlns:a="http://schemas.openxmlformats.org/drawingml/2006/main" id="251">
+  <cs:axisTitle>
+    <cs:lnRef idx="0"/>
+    <cs:fillRef idx="0"/>
+    <cs:effectRef idx="0"/>
+    <cs:fontRef idx="minor">
+      <a:schemeClr val="tx1">
+        <a:lumMod val="65000"/>
+        <a:lumOff val="35000"/>
+      </a:schemeClr>
+    </cs:fontRef>
+    <cs:defRPr sz="1330" kern="1200"/>
+  </cs:axisTitle>
+  <cs:categoryAxis>
+    <cs:lnRef idx="0"/>
+    <cs:fillRef idx="0"/>
+    <cs:effectRef idx="0"/>
+    <cs:fontRef idx="minor">
+      <a:schemeClr val="tx1">
+        <a:lumMod val="65000"/>
+        <a:lumOff val="35000"/>
+      </a:schemeClr>
+    </cs:fontRef>
+    <cs:spPr>
+      <a:ln w="9525" cap="flat" cmpd="sng" algn="ctr">
+        <a:solidFill>
+          <a:schemeClr val="tx1">
+            <a:lumMod val="15000"/>
+            <a:lumOff val="85000"/>
+          </a:schemeClr>
+        </a:solidFill>
+        <a:round/>
+      </a:ln>
+    </cs:spPr>
+    <cs:defRPr sz="1197" kern="1200"/>
+  </cs:categoryAxis>
+  <cs:chartArea mods="allowNoFillOverride allowNoLineOverride">
+    <cs:lnRef idx="0"/>
+    <cs:fillRef idx="0"/>
+    <cs:effectRef idx="0"/>
+    <cs:fontRef idx="minor">
+      <a:schemeClr val="tx1"/>
+    </cs:fontRef>
+    <cs:spPr>
+      <a:solidFill>
+        <a:schemeClr val="bg1"/>
+      </a:solidFill>
+      <a:ln w="9525" cap="flat" cmpd="sng" algn="ctr">
+        <a:solidFill>
+          <a:schemeClr val="tx1">
+            <a:lumMod val="15000"/>
+            <a:lumOff val="85000"/>
+          </a:schemeClr>
+        </a:solidFill>
+        <a:round/>
+      </a:ln>
+    </cs:spPr>
+    <cs:defRPr sz="1197" kern="1200"/>
+  </cs:chartArea>
+  <cs:dataLabel>
+    <cs:lnRef idx="0"/>
+    <cs:fillRef idx="0"/>
+    <cs:effectRef idx="0"/>
+    <cs:fontRef idx="minor">
+      <a:schemeClr val="tx1">
+        <a:lumMod val="75000"/>
+        <a:lumOff val="25000"/>
+      </a:schemeClr>
+    </cs:fontRef>
+    <cs:defRPr sz="1197" kern="1200"/>
+  </cs:dataLabel>
+  <cs:dataLabelCallout>
+    <cs:lnRef idx="0"/>
+    <cs:fillRef idx="0"/>
+    <cs:effectRef idx="0"/>
+    <cs:fontRef idx="minor">
+      <a:schemeClr val="dk1">
+        <a:lumMod val="65000"/>
+        <a:lumOff val="35000"/>
+      </a:schemeClr>
+    </cs:fontRef>
+    <cs:spPr>
+      <a:solidFill>
+        <a:schemeClr val="lt1"/>
+      </a:solidFill>
+      <a:ln>
+        <a:solidFill>
+          <a:schemeClr val="dk1">
+            <a:lumMod val="25000"/>
+            <a:lumOff val="75000"/>
+          </a:schemeClr>
+        </a:solidFill>
+      </a:ln>
+    </cs:spPr>
+    <cs:defRPr sz="1197" kern="1200"/>
+    <cs:bodyPr rot="0" spcFirstLastPara="1" vertOverflow="clip" horzOverflow="clip" vert="horz" wrap="square" lIns="36576" tIns="18288" rIns="36576" bIns="18288" anchor="ctr" anchorCtr="1">
+      <a:spAutoFit/>
+    </cs:bodyPr>
+  </cs:dataLabelCallout>
+  <cs:dataPoint>
+    <cs:lnRef idx="0"/>
+    <cs:fillRef idx="1">
+      <cs:styleClr val="auto"/>
+    </cs:fillRef>
+    <cs:effectRef idx="0"/>
+    <cs:fontRef idx="minor">
+      <a:schemeClr val="tx1"/>
+    </cs:fontRef>
+    <cs:spPr>
+      <a:ln w="19050">
+        <a:solidFill>
+          <a:schemeClr val="lt1"/>
+        </a:solidFill>
+      </a:ln>
+    </cs:spPr>
+  </cs:dataPoint>
+  <cs:dataPoint3D>
+    <cs:lnRef idx="0"/>
+    <cs:fillRef idx="1">
+      <cs:styleClr val="auto"/>
+    </cs:fillRef>
+    <cs:effectRef idx="0"/>
+    <cs:fontRef idx="minor">
+      <a:schemeClr val="tx1"/>
+    </cs:fontRef>
+    <cs:spPr>
+      <a:ln w="25400">
+        <a:solidFill>
+          <a:schemeClr val="lt1"/>
+        </a:solidFill>
+      </a:ln>
+    </cs:spPr>
+  </cs:dataPoint3D>
+  <cs:dataPointLine>
+    <cs:lnRef idx="0">
+      <cs:styleClr val="auto"/>
+    </cs:lnRef>
+    <cs:fillRef idx="0"/>
+    <cs:effectRef idx="0"/>
+    <cs:fontRef idx="minor">
+      <a:schemeClr val="tx1"/>
+    </cs:fontRef>
+    <cs:spPr>
+      <a:ln w="28575" cap="rnd">
+        <a:solidFill>
+          <a:schemeClr val="phClr"/>
+        </a:solidFill>
+        <a:round/>
+      </a:ln>
+    </cs:spPr>
+  </cs:dataPointLine>
+  <cs:dataPointMarker>
+    <cs:lnRef idx="0">
+      <cs:styleClr val="auto"/>
+    </cs:lnRef>
+    <cs:fillRef idx="1">
+      <cs:styleClr val="auto"/>
+    </cs:fillRef>
+    <cs:effectRef idx="0"/>
+    <cs:fontRef idx="minor">
+      <a:schemeClr val="tx1"/>
+    </cs:fontRef>
+    <cs:spPr>
+      <a:ln w="9525">
+        <a:solidFill>
+          <a:schemeClr val="phClr"/>
+        </a:solidFill>
+      </a:ln>
+    </cs:spPr>
+  </cs:dataPointMarker>
+  <cs:dataPointMarkerLayout symbol="circle" size="5"/>
+  <cs:dataPointWireframe>
+    <cs:lnRef idx="0">
+      <cs:styleClr val="auto"/>
+    </cs:lnRef>
+    <cs:fillRef idx="0"/>
+    <cs:effectRef idx="0"/>
+    <cs:fontRef idx="minor">
+      <a:schemeClr val="tx1"/>
+    </cs:fontRef>
+    <cs:spPr>
+      <a:ln w="9525" cap="rnd">
+        <a:solidFill>
+          <a:schemeClr val="phClr"/>
+        </a:solidFill>
+        <a:round/>
+      </a:ln>
+    </cs:spPr>
+  </cs:dataPointWireframe>
+  <cs:dataTable>
+    <cs:lnRef idx="0"/>
+    <cs:fillRef idx="0"/>
+    <cs:effectRef idx="0"/>
+    <cs:fontRef idx="minor">
+      <a:schemeClr val="tx1">
+        <a:lumMod val="65000"/>
+        <a:lumOff val="35000"/>
+      </a:schemeClr>
+    </cs:fontRef>
+    <cs:spPr>
+      <a:noFill/>
+      <a:ln w="9525" cap="flat" cmpd="sng" algn="ctr">
+        <a:solidFill>
+          <a:schemeClr val="tx1">
+            <a:lumMod val="15000"/>
+            <a:lumOff val="85000"/>
+          </a:schemeClr>
+        </a:solidFill>
+        <a:round/>
+      </a:ln>
+    </cs:spPr>
+    <cs:defRPr sz="1197" kern="1200"/>
+  </cs:dataTable>
+  <cs:downBar>
+    <cs:lnRef idx="0"/>
+    <cs:fillRef idx="0"/>
+    <cs:effectRef idx="0"/>
+    <cs:fontRef idx="minor">
+      <a:schemeClr val="tx1"/>
+    </cs:fontRef>
+    <cs:spPr>
+      <a:solidFill>
+        <a:schemeClr val="dk1">
+          <a:lumMod val="75000"/>
+          <a:lumOff val="25000"/>
+        </a:schemeClr>
+      </a:solidFill>
+      <a:ln w="9525" cap="flat" cmpd="sng" algn="ctr">
+        <a:solidFill>
+          <a:schemeClr val="tx1">
+            <a:lumMod val="65000"/>
+            <a:lumOff val="35000"/>
+          </a:schemeClr>
+        </a:solidFill>
+        <a:round/>
+      </a:ln>
+    </cs:spPr>
+  </cs:downBar>
+  <cs:dropLine>
+    <cs:lnRef idx="0"/>
+    <cs:fillRef idx="0"/>
+    <cs:effectRef idx="0"/>
+    <cs:fontRef idx="minor">
+      <a:schemeClr val="tx1"/>
+    </cs:fontRef>
+    <cs:spPr>
+      <a:ln w="9525" cap="flat" cmpd="sng" algn="ctr">
+        <a:solidFill>
+          <a:schemeClr val="tx1">
+            <a:lumMod val="35000"/>
+            <a:lumOff val="65000"/>
+          </a:schemeClr>
+        </a:solidFill>
+        <a:round/>
+      </a:ln>
+    </cs:spPr>
+  </cs:dropLine>
+  <cs:errorBar>
+    <cs:lnRef idx="0"/>
+    <cs:fillRef idx="0"/>
+    <cs:effectRef idx="0"/>
+    <cs:fontRef idx="minor">
+      <a:schemeClr val="tx1"/>
+    </cs:fontRef>
+    <cs:spPr>
+      <a:ln w="9525" cap="flat" cmpd="sng" algn="ctr">
+        <a:solidFill>
+          <a:schemeClr val="tx1">
+            <a:lumMod val="65000"/>
+            <a:lumOff val="35000"/>
+          </a:schemeClr>
+        </a:solidFill>
+        <a:round/>
+      </a:ln>
+    </cs:spPr>
+  </cs:errorBar>
+  <cs:floor>
+    <cs:lnRef idx="0"/>
+    <cs:fillRef idx="0"/>
+    <cs:effectRef idx="0"/>
+    <cs:fontRef idx="minor">
+      <a:schemeClr val="tx1"/>
+    </cs:fontRef>
+    <cs:spPr>
+      <a:noFill/>
+      <a:ln>
+        <a:noFill/>
+      </a:ln>
+    </cs:spPr>
+  </cs:floor>
+  <cs:gridlineMajor>
+    <cs:lnRef idx="0"/>
+    <cs:fillRef idx="0"/>
+    <cs:effectRef idx="0"/>
+    <cs:fontRef idx="minor">
+      <a:schemeClr val="tx1"/>
+    </cs:fontRef>
+    <cs:spPr>
+      <a:ln w="9525" cap="flat" cmpd="sng" algn="ctr">
+        <a:solidFill>
+          <a:schemeClr val="tx1">
+            <a:lumMod val="15000"/>
+            <a:lumOff val="85000"/>
+          </a:schemeClr>
+        </a:solidFill>
+        <a:round/>
+      </a:ln>
+    </cs:spPr>
+  </cs:gridlineMajor>
+  <cs:gridlineMinor>
+    <cs:lnRef idx="0"/>
+    <cs:fillRef idx="0"/>
+    <cs:effectRef idx="0"/>
+    <cs:fontRef idx="minor">
+      <a:schemeClr val="tx1"/>
+    </cs:fontRef>
+    <cs:spPr>
+      <a:ln w="9525" cap="flat" cmpd="sng" algn="ctr">
+        <a:solidFill>
+          <a:schemeClr val="tx1">
+            <a:lumMod val="5000"/>
+            <a:lumOff val="95000"/>
+          </a:schemeClr>
+        </a:solidFill>
+        <a:round/>
+      </a:ln>
+    </cs:spPr>
+  </cs:gridlineMinor>
+  <cs:hiLoLine>
+    <cs:lnRef idx="0"/>
+    <cs:fillRef idx="0"/>
+    <cs:effectRef idx="0"/>
+    <cs:fontRef idx="minor">
+      <a:schemeClr val="tx1"/>
+    </cs:fontRef>
+    <cs:spPr>
+      <a:ln w="9525" cap="flat" cmpd="sng" algn="ctr">
+        <a:solidFill>
+          <a:schemeClr val="tx1">
+            <a:lumMod val="50000"/>
+            <a:lumOff val="50000"/>
+          </a:schemeClr>
+        </a:solidFill>
+        <a:round/>
+      </a:ln>
+    </cs:spPr>
+  </cs:hiLoLine>
+  <cs:leaderLine>
+    <cs:lnRef idx="0"/>
+    <cs:fillRef idx="0"/>
+    <cs:effectRef idx="0"/>
+    <cs:fontRef idx="minor">
+      <a:schemeClr val="tx1"/>
+    </cs:fontRef>
+    <cs:spPr>
+      <a:ln w="9525" cap="flat" cmpd="sng" algn="ctr">
+        <a:solidFill>
+          <a:schemeClr val="tx1">
+            <a:lumMod val="35000"/>
+            <a:lumOff val="65000"/>
+          </a:schemeClr>
+        </a:solidFill>
+        <a:round/>
+      </a:ln>
+    </cs:spPr>
+  </cs:leaderLine>
+  <cs:legend>
+    <cs:lnRef idx="0"/>
+    <cs:fillRef idx="0"/>
+    <cs:effectRef idx="0"/>
+    <cs:fontRef idx="minor">
+      <a:schemeClr val="tx1">
+        <a:lumMod val="65000"/>
+        <a:lumOff val="35000"/>
+      </a:schemeClr>
+    </cs:fontRef>
+    <cs:defRPr sz="1197" kern="1200"/>
+  </cs:legend>
+  <cs:plotArea mods="allowNoFillOverride allowNoLineOverride">
+    <cs:lnRef idx="0"/>
+    <cs:fillRef idx="0"/>
+    <cs:effectRef idx="0"/>
+    <cs:fontRef idx="minor">
+      <a:schemeClr val="tx1"/>
+    </cs:fontRef>
+  </cs:plotArea>
+  <cs:plotArea3D mods="allowNoFillOverride allowNoLineOverride">
+    <cs:lnRef idx="0"/>
+    <cs:fillRef idx="0"/>
+    <cs:effectRef idx="0"/>
+    <cs:fontRef idx="minor">
+      <a:schemeClr val="tx1"/>
+    </cs:fontRef>
+  </cs:plotArea3D>
+  <cs:seriesAxis>
+    <cs:lnRef idx="0"/>
+    <cs:fillRef idx="0"/>
+    <cs:effectRef idx="0"/>
+    <cs:fontRef idx="minor">
+      <a:schemeClr val="tx1">
+        <a:lumMod val="65000"/>
+        <a:lumOff val="35000"/>
+      </a:schemeClr>
+    </cs:fontRef>
+    <cs:defRPr sz="1197" kern="1200"/>
+  </cs:seriesAxis>
+  <cs:seriesLine>
+    <cs:lnRef idx="0"/>
+    <cs:fillRef idx="0"/>
+    <cs:effectRef idx="0"/>
+    <cs:fontRef idx="minor">
+      <a:schemeClr val="tx1"/>
+    </cs:fontRef>
+    <cs:spPr>
+      <a:ln w="9525" cap="flat" cmpd="sng" algn="ctr">
+        <a:solidFill>
+          <a:schemeClr val="tx1">
+            <a:lumMod val="35000"/>
+            <a:lumOff val="65000"/>
+          </a:schemeClr>
+        </a:solidFill>
+        <a:round/>
+      </a:ln>
+    </cs:spPr>
+  </cs:seriesLine>
+  <cs:title>
+    <cs:lnRef idx="0"/>
+    <cs:fillRef idx="0"/>
+    <cs:effectRef idx="0"/>
+    <cs:fontRef idx="minor">
+      <a:schemeClr val="tx1">
+        <a:lumMod val="65000"/>
+        <a:lumOff val="35000"/>
+      </a:schemeClr>
+    </cs:fontRef>
+    <cs:defRPr sz="1862" b="0" kern="1200" spc="0" baseline="0"/>
+  </cs:title>
+  <cs:trendline>
+    <cs:lnRef idx="0">
+      <cs:styleClr val="auto"/>
+    </cs:lnRef>
+    <cs:fillRef idx="0"/>
+    <cs:effectRef idx="0"/>
+    <cs:fontRef idx="minor">
+      <a:schemeClr val="tx1"/>
+    </cs:fontRef>
+    <cs:spPr>
+      <a:ln w="19050" cap="rnd">
+        <a:solidFill>
+          <a:schemeClr val="phClr"/>
+        </a:solidFill>
+        <a:prstDash val="sysDot"/>
+      </a:ln>
+    </cs:spPr>
+  </cs:trendline>
+  <cs:trendlineLabel>
+    <cs:lnRef idx="0"/>
+    <cs:fillRef idx="0"/>
+    <cs:effectRef idx="0"/>
+    <cs:fontRef idx="minor">
+      <a:schemeClr val="tx1">
+        <a:lumMod val="65000"/>
+        <a:lumOff val="35000"/>
+      </a:schemeClr>
+    </cs:fontRef>
+    <cs:defRPr sz="1197" kern="1200"/>
+  </cs:trendlineLabel>
+  <cs:upBar>
+    <cs:lnRef idx="0"/>
+    <cs:fillRef idx="0"/>
+    <cs:effectRef idx="0"/>
+    <cs:fontRef idx="minor">
+      <a:schemeClr val="tx1"/>
+    </cs:fontRef>
+    <cs:spPr>
+      <a:solidFill>
+        <a:schemeClr val="lt1"/>
+      </a:solidFill>
+      <a:ln w="9525" cap="flat" cmpd="sng" algn="ctr">
+        <a:solidFill>
+          <a:schemeClr val="tx1">
+            <a:lumMod val="65000"/>
+            <a:lumOff val="35000"/>
+          </a:schemeClr>
+        </a:solidFill>
+        <a:round/>
+      </a:ln>
+    </cs:spPr>
+  </cs:upBar>
+  <cs:valueAxis>
+    <cs:lnRef idx="0"/>
+    <cs:fillRef idx="0"/>
+    <cs:effectRef idx="0"/>
+    <cs:fontRef idx="minor">
+      <a:schemeClr val="tx1">
+        <a:lumMod val="65000"/>
+        <a:lumOff val="35000"/>
+      </a:schemeClr>
+    </cs:fontRef>
+    <cs:defRPr sz="1197" kern="1200"/>
+  </cs:valueAxis>
+  <cs:wall>
+    <cs:lnRef idx="0"/>
+    <cs:fillRef idx="0"/>
+    <cs:effectRef idx="0"/>
+    <cs:fontRef idx="minor">
+      <a:schemeClr val="tx1"/>
+    </cs:fontRef>
+    <cs:spPr>
+      <a:noFill/>
+      <a:ln>
+        <a:noFill/>
+      </a:ln>
+    </cs:spPr>
+  </cs:wall>
+</cs:chartStyle>
+</file>
+
 <file path=ppt/slideLayouts/slideLayout1.xml><?xml version="1.0" encoding="utf-8"?>
 <p:sldLayout xmlns:a="http://schemas.openxmlformats.org/drawingml/2006/main" xmlns:r="http://schemas.openxmlformats.org/officeDocument/2006/relationships" xmlns:p="http://schemas.openxmlformats.org/presentationml/2006/main" type="title" preserve="1">
   <p:cSld name="Title Slide">
@@ -8716,7 +9572,15 @@
             </a:r>
             <a:r>
               <a:rPr lang="en-US" sz="2800" dirty="0" smtClean="0"/>
-              <a:t>B, Flask, Splash page</a:t>
+              <a:t>B, Flask, </a:t>
+            </a:r>
+            <a:r>
+              <a:rPr lang="en-US" sz="2800" dirty="0" smtClean="0"/>
+              <a:t>splash </a:t>
+            </a:r>
+            <a:r>
+              <a:rPr lang="en-US" sz="2800" dirty="0" smtClean="0"/>
+              <a:t>page</a:t>
             </a:r>
           </a:p>
           <a:p>
@@ -8738,7 +9602,15 @@
             <a:pPr lvl="1"/>
             <a:r>
               <a:rPr lang="en-US" sz="2800" dirty="0" smtClean="0"/>
-              <a:t>API, Model pages</a:t>
+              <a:t>API, </a:t>
+            </a:r>
+            <a:r>
+              <a:rPr lang="en-US" sz="2800" dirty="0" smtClean="0"/>
+              <a:t>model </a:t>
+            </a:r>
+            <a:r>
+              <a:rPr lang="en-US" sz="2800" dirty="0" smtClean="0"/>
+              <a:t>pages</a:t>
             </a:r>
           </a:p>
         </p:txBody>
@@ -8793,7 +9665,11 @@
             <a:pPr lvl="1"/>
             <a:r>
               <a:rPr lang="en-US" sz="2800" dirty="0" smtClean="0"/>
-              <a:t>Bootstrap, styling</a:t>
+              <a:t>Bootstrap, </a:t>
+            </a:r>
+            <a:r>
+              <a:rPr lang="en-US" sz="2800" dirty="0" smtClean="0"/>
+              <a:t>individual pages</a:t>
             </a:r>
             <a:endParaRPr lang="en-US" sz="2800" dirty="0"/>
           </a:p>
@@ -9297,7 +10173,11 @@
           <a:p>
             <a:r>
               <a:rPr lang="en-US" dirty="0" smtClean="0"/>
-              <a:t>Unit Tests</a:t>
+              <a:t>Unit </a:t>
+            </a:r>
+            <a:r>
+              <a:rPr lang="en-US" dirty="0" smtClean="0"/>
+              <a:t>Tests (9 Total)</a:t>
             </a:r>
             <a:endParaRPr lang="en-US" dirty="0"/>
           </a:p>
@@ -9313,31 +10193,174 @@
             <p:ph sz="half" idx="1"/>
           </p:nvPr>
         </p:nvSpPr>
-        <p:spPr/>
-        <p:txBody>
-          <a:bodyPr/>
+        <p:spPr>
+          <a:xfrm>
+            <a:off x="646111" y="1608082"/>
+            <a:ext cx="4814013" cy="3048001"/>
+          </a:xfrm>
+        </p:spPr>
+        <p:txBody>
+          <a:bodyPr>
+            <a:normAutofit/>
+          </a:bodyPr>
           <a:lstStyle/>
           <a:p>
-            <a:endParaRPr lang="en-US"/>
-          </a:p>
-        </p:txBody>
-      </p:sp>
-      <p:sp>
-        <p:nvSpPr>
-          <p:cNvPr id="4" name="Content Placeholder 3"/>
-          <p:cNvSpPr>
-            <a:spLocks noGrp="1"/>
-          </p:cNvSpPr>
-          <p:nvPr>
-            <p:ph sz="half" idx="2"/>
-          </p:nvPr>
-        </p:nvSpPr>
-        <p:spPr/>
-        <p:txBody>
-          <a:bodyPr/>
+            <a:r>
+              <a:rPr lang="en-US" sz="3200" dirty="0" smtClean="0"/>
+              <a:t>Kieran </a:t>
+            </a:r>
+            <a:r>
+              <a:rPr lang="mr-IN" sz="3200" dirty="0" smtClean="0"/>
+              <a:t>–</a:t>
+            </a:r>
+            <a:r>
+              <a:rPr lang="en-US" sz="3200" dirty="0" smtClean="0"/>
+              <a:t> 9</a:t>
+            </a:r>
+          </a:p>
+          <a:p>
+            <a:r>
+              <a:rPr lang="en-US" sz="3200" dirty="0" smtClean="0"/>
+              <a:t>Sarah </a:t>
+            </a:r>
+            <a:r>
+              <a:rPr lang="mr-IN" sz="3200" dirty="0"/>
+              <a:t>–</a:t>
+            </a:r>
+            <a:r>
+              <a:rPr lang="en-US" sz="3200" dirty="0"/>
+              <a:t> </a:t>
+            </a:r>
+            <a:r>
+              <a:rPr lang="en-US" sz="3200" dirty="0" smtClean="0"/>
+              <a:t>0</a:t>
+            </a:r>
+            <a:endParaRPr lang="en-US" sz="3200" dirty="0"/>
+          </a:p>
+          <a:p>
+            <a:r>
+              <a:rPr lang="en-US" sz="3200" dirty="0"/>
+              <a:t>Peyton </a:t>
+            </a:r>
+            <a:r>
+              <a:rPr lang="mr-IN" sz="3200" dirty="0"/>
+              <a:t>–</a:t>
+            </a:r>
+            <a:r>
+              <a:rPr lang="en-US" sz="3200" dirty="0"/>
+              <a:t> 0</a:t>
+            </a:r>
+          </a:p>
+          <a:p>
+            <a:r>
+              <a:rPr lang="en-US" sz="3200" dirty="0" err="1"/>
+              <a:t>Apurva</a:t>
+            </a:r>
+            <a:r>
+              <a:rPr lang="en-US" sz="3200" dirty="0"/>
+              <a:t> </a:t>
+            </a:r>
+            <a:r>
+              <a:rPr lang="mr-IN" sz="3200" dirty="0"/>
+              <a:t>–</a:t>
+            </a:r>
+            <a:r>
+              <a:rPr lang="en-US" sz="3200" dirty="0"/>
+              <a:t> 0</a:t>
+            </a:r>
+          </a:p>
+          <a:p>
+            <a:r>
+              <a:rPr lang="en-US" sz="3200" dirty="0" smtClean="0"/>
+              <a:t>Eryn </a:t>
+            </a:r>
+            <a:r>
+              <a:rPr lang="mr-IN" sz="3200" dirty="0"/>
+              <a:t>–</a:t>
+            </a:r>
+            <a:r>
+              <a:rPr lang="en-US" sz="3200" dirty="0"/>
+              <a:t> </a:t>
+            </a:r>
+            <a:r>
+              <a:rPr lang="en-US" sz="3200" dirty="0" smtClean="0"/>
+              <a:t>0</a:t>
+            </a:r>
+            <a:endParaRPr lang="en-US" sz="3200" dirty="0"/>
+          </a:p>
+          <a:p>
+            <a:endParaRPr lang="en-US" sz="3200" dirty="0"/>
+          </a:p>
+        </p:txBody>
+      </p:sp>
+      <p:graphicFrame>
+        <p:nvGraphicFramePr>
+          <p:cNvPr id="5" name="Chart 4"/>
+          <p:cNvGraphicFramePr/>
+          <p:nvPr>
+            <p:extLst>
+              <p:ext uri="{D42A27DB-BD31-4B8C-83A1-F6EECF244321}">
+                <p14:modId xmlns:p14="http://schemas.microsoft.com/office/powerpoint/2010/main" val="1767016741"/>
+              </p:ext>
+            </p:extLst>
+          </p:nvPr>
+        </p:nvGraphicFramePr>
+        <p:xfrm>
+          <a:off x="4855778" y="1211081"/>
+          <a:ext cx="6166069" cy="4835050"/>
+        </p:xfrm>
+        <a:graphic>
+          <a:graphicData uri="http://schemas.openxmlformats.org/drawingml/2006/chart">
+            <c:chart xmlns:c="http://schemas.openxmlformats.org/drawingml/2006/chart" xmlns:r="http://schemas.openxmlformats.org/officeDocument/2006/relationships" r:id="rId2"/>
+          </a:graphicData>
+        </a:graphic>
+      </p:graphicFrame>
+      <p:sp>
+        <p:nvSpPr>
+          <p:cNvPr id="6" name="Rounded Rectangle 5">
+            <a:hlinkClick r:id="rId3"/>
+          </p:cNvPr>
+          <p:cNvSpPr/>
+          <p:nvPr/>
+        </p:nvSpPr>
+        <p:spPr>
+          <a:xfrm>
+            <a:off x="646111" y="5214838"/>
+            <a:ext cx="2254253" cy="856302"/>
+          </a:xfrm>
+          <a:prstGeom prst="roundRect">
+            <a:avLst/>
+          </a:prstGeom>
+          <a:solidFill>
+            <a:srgbClr val="FFC000"/>
+          </a:solidFill>
+        </p:spPr>
+        <p:style>
+          <a:lnRef idx="2">
+            <a:schemeClr val="accent1">
+              <a:shade val="50000"/>
+            </a:schemeClr>
+          </a:lnRef>
+          <a:fillRef idx="1">
+            <a:schemeClr val="accent1"/>
+          </a:fillRef>
+          <a:effectRef idx="0">
+            <a:schemeClr val="accent1"/>
+          </a:effectRef>
+          <a:fontRef idx="minor">
+            <a:schemeClr val="lt1"/>
+          </a:fontRef>
+        </p:style>
+        <p:txBody>
+          <a:bodyPr rtlCol="0" anchor="ctr"/>
           <a:lstStyle/>
           <a:p>
-            <a:endParaRPr lang="en-US"/>
+            <a:pPr algn="ctr"/>
+            <a:r>
+              <a:rPr lang="en-US" smtClean="0"/>
+              <a:t>Run Unit Test!</a:t>
+            </a:r>
+            <a:endParaRPr lang="en-US" dirty="0"/>
           </a:p>
         </p:txBody>
       </p:sp>
@@ -9395,7 +10418,7 @@
           <a:p>
             <a:r>
               <a:rPr lang="en-US" dirty="0" smtClean="0"/>
-              <a:t>Critiques</a:t>
+              <a:t>Self Critiques</a:t>
             </a:r>
             <a:endParaRPr lang="en-US" dirty="0"/>
           </a:p>
@@ -9411,12 +10434,75 @@
             <p:ph sz="half" idx="1"/>
           </p:nvPr>
         </p:nvSpPr>
-        <p:spPr/>
-        <p:txBody>
-          <a:bodyPr/>
+        <p:spPr>
+          <a:xfrm>
+            <a:off x="1103312" y="1745265"/>
+            <a:ext cx="4396339" cy="4195763"/>
+          </a:xfrm>
+        </p:spPr>
+        <p:txBody>
+          <a:bodyPr>
+            <a:noAutofit/>
+          </a:bodyPr>
           <a:lstStyle/>
           <a:p>
-            <a:endParaRPr lang="en-US" dirty="0"/>
+            <a:r>
+              <a:rPr lang="en-US" sz="2000" dirty="0" smtClean="0"/>
+              <a:t>What did we do well?</a:t>
+            </a:r>
+          </a:p>
+          <a:p>
+            <a:pPr lvl="1"/>
+            <a:r>
+              <a:rPr lang="en-US" sz="2000" dirty="0" smtClean="0"/>
+              <a:t>Stayed passionate about the theme and had fun</a:t>
+            </a:r>
+          </a:p>
+          <a:p>
+            <a:pPr lvl="1"/>
+            <a:r>
+              <a:rPr lang="en-US" sz="2000" dirty="0" smtClean="0"/>
+              <a:t>Stayed close to </a:t>
+            </a:r>
+            <a:r>
+              <a:rPr lang="en-US" sz="2000" dirty="0" err="1" smtClean="0"/>
+              <a:t>GoT</a:t>
+            </a:r>
+            <a:r>
+              <a:rPr lang="en-US" sz="2000" dirty="0" smtClean="0"/>
+              <a:t> theme</a:t>
+            </a:r>
+          </a:p>
+          <a:p>
+            <a:pPr lvl="1"/>
+            <a:r>
+              <a:rPr lang="en-US" sz="2000" dirty="0" smtClean="0"/>
+              <a:t>Had a constantly moving workflow</a:t>
+            </a:r>
+          </a:p>
+          <a:p>
+            <a:endParaRPr lang="en-US" sz="2000" dirty="0"/>
+          </a:p>
+          <a:p>
+            <a:r>
+              <a:rPr lang="en-US" sz="2000" dirty="0" smtClean="0"/>
+              <a:t>What puzzles us?</a:t>
+            </a:r>
+          </a:p>
+          <a:p>
+            <a:pPr lvl="1"/>
+            <a:r>
+              <a:rPr lang="en-US" sz="2000" dirty="0" smtClean="0"/>
+              <a:t>CSS !important</a:t>
+            </a:r>
+          </a:p>
+          <a:p>
+            <a:pPr lvl="1"/>
+            <a:r>
+              <a:rPr lang="en-US" sz="2000" dirty="0" smtClean="0"/>
+              <a:t>Communication between back-end and front-end</a:t>
+            </a:r>
+            <a:endParaRPr lang="en-US" sz="2000" dirty="0" smtClean="0"/>
           </a:p>
         </p:txBody>
       </p:sp>
@@ -9430,12 +10516,64 @@
             <p:ph sz="half" idx="2"/>
           </p:nvPr>
         </p:nvSpPr>
-        <p:spPr/>
-        <p:txBody>
-          <a:bodyPr/>
+        <p:spPr>
+          <a:xfrm>
+            <a:off x="6579402" y="1853248"/>
+            <a:ext cx="4396341" cy="4200245"/>
+          </a:xfrm>
+        </p:spPr>
+        <p:txBody>
+          <a:bodyPr>
+            <a:noAutofit/>
+          </a:bodyPr>
           <a:lstStyle/>
           <a:p>
-            <a:endParaRPr lang="en-US"/>
+            <a:r>
+              <a:rPr lang="en-US" sz="2000" dirty="0" smtClean="0"/>
+              <a:t>What did we learn?</a:t>
+            </a:r>
+          </a:p>
+          <a:p>
+            <a:pPr lvl="1"/>
+            <a:r>
+              <a:rPr lang="en-US" sz="2000" dirty="0" smtClean="0"/>
+              <a:t>Tools: JS, Bootstrap, Flask, and python!</a:t>
+            </a:r>
+          </a:p>
+          <a:p>
+            <a:pPr lvl="1"/>
+            <a:r>
+              <a:rPr lang="en-US" sz="2000" dirty="0" smtClean="0"/>
+              <a:t>Cache</a:t>
+            </a:r>
+          </a:p>
+          <a:p>
+            <a:pPr lvl="1"/>
+            <a:endParaRPr lang="en-US" sz="2000" dirty="0"/>
+          </a:p>
+          <a:p>
+            <a:endParaRPr lang="en-US" sz="2000" dirty="0"/>
+          </a:p>
+          <a:p>
+            <a:r>
+              <a:rPr lang="en-US" sz="2000" dirty="0" smtClean="0"/>
+              <a:t>What could we have done better?</a:t>
+            </a:r>
+          </a:p>
+          <a:p>
+            <a:pPr lvl="1"/>
+            <a:r>
+              <a:rPr lang="en-US" sz="2000" dirty="0" smtClean="0"/>
+              <a:t>Being more proactive</a:t>
+            </a:r>
+          </a:p>
+          <a:p>
+            <a:pPr lvl="1"/>
+            <a:r>
+              <a:rPr lang="en-US" sz="2000" dirty="0" smtClean="0"/>
+              <a:t>Starting earlier</a:t>
+            </a:r>
+            <a:endParaRPr lang="en-US" sz="2000" dirty="0"/>
           </a:p>
         </p:txBody>
       </p:sp>
@@ -9460,6 +10598,201 @@
 </file>
 
 <file path=ppt/slides/slide8.xml><?xml version="1.0" encoding="utf-8"?>
+<p:sld xmlns:a="http://schemas.openxmlformats.org/drawingml/2006/main" xmlns:r="http://schemas.openxmlformats.org/officeDocument/2006/relationships" xmlns:p="http://schemas.openxmlformats.org/presentationml/2006/main">
+  <p:cSld>
+    <p:spTree>
+      <p:nvGrpSpPr>
+        <p:cNvPr id="1" name=""/>
+        <p:cNvGrpSpPr/>
+        <p:nvPr/>
+      </p:nvGrpSpPr>
+      <p:grpSpPr>
+        <a:xfrm>
+          <a:off x="0" y="0"/>
+          <a:ext cx="0" cy="0"/>
+          <a:chOff x="0" y="0"/>
+          <a:chExt cx="0" cy="0"/>
+        </a:xfrm>
+      </p:grpSpPr>
+      <p:sp>
+        <p:nvSpPr>
+          <p:cNvPr id="2" name="Title 1"/>
+          <p:cNvSpPr>
+            <a:spLocks noGrp="1"/>
+          </p:cNvSpPr>
+          <p:nvPr>
+            <p:ph type="title"/>
+          </p:nvPr>
+        </p:nvSpPr>
+        <p:spPr/>
+        <p:txBody>
+          <a:bodyPr/>
+          <a:lstStyle/>
+          <a:p>
+            <a:r>
+              <a:rPr lang="en-US" dirty="0" smtClean="0"/>
+              <a:t>Critique Inebri8</a:t>
+            </a:r>
+            <a:endParaRPr lang="en-US" dirty="0"/>
+          </a:p>
+        </p:txBody>
+      </p:sp>
+      <p:sp>
+        <p:nvSpPr>
+          <p:cNvPr id="3" name="Content Placeholder 2"/>
+          <p:cNvSpPr>
+            <a:spLocks noGrp="1"/>
+          </p:cNvSpPr>
+          <p:nvPr>
+            <p:ph sz="half" idx="1"/>
+          </p:nvPr>
+        </p:nvSpPr>
+        <p:spPr>
+          <a:xfrm>
+            <a:off x="1103312" y="1857730"/>
+            <a:ext cx="4396339" cy="4195763"/>
+          </a:xfrm>
+        </p:spPr>
+        <p:txBody>
+          <a:bodyPr>
+            <a:normAutofit lnSpcReduction="10000"/>
+          </a:bodyPr>
+          <a:lstStyle/>
+          <a:p>
+            <a:r>
+              <a:rPr lang="en-US" sz="2000" dirty="0" smtClean="0"/>
+              <a:t>What did they do well?</a:t>
+            </a:r>
+          </a:p>
+          <a:p>
+            <a:pPr lvl="1"/>
+            <a:r>
+              <a:rPr lang="en-US" sz="2000" dirty="0" smtClean="0"/>
+              <a:t>Splash page looks welcoming</a:t>
+            </a:r>
+          </a:p>
+          <a:p>
+            <a:pPr lvl="1"/>
+            <a:r>
+              <a:rPr lang="en-US" sz="2000" dirty="0" smtClean="0"/>
+              <a:t>Topic is fun and useful</a:t>
+            </a:r>
+          </a:p>
+          <a:p>
+            <a:pPr lvl="1"/>
+            <a:endParaRPr lang="en-US" sz="2000" dirty="0"/>
+          </a:p>
+          <a:p>
+            <a:pPr lvl="1"/>
+            <a:endParaRPr lang="en-US" sz="2000" dirty="0"/>
+          </a:p>
+          <a:p>
+            <a:r>
+              <a:rPr lang="en-US" sz="2000" dirty="0" smtClean="0"/>
+              <a:t>What did we learn from them?</a:t>
+            </a:r>
+          </a:p>
+          <a:p>
+            <a:pPr lvl="1"/>
+            <a:r>
+              <a:rPr lang="en-US" sz="2000" dirty="0" smtClean="0"/>
+              <a:t>Importance of good API documentation</a:t>
+            </a:r>
+          </a:p>
+          <a:p>
+            <a:pPr lvl="1"/>
+            <a:endParaRPr lang="en-US" sz="2000" dirty="0"/>
+          </a:p>
+        </p:txBody>
+      </p:sp>
+      <p:sp>
+        <p:nvSpPr>
+          <p:cNvPr id="4" name="Content Placeholder 3"/>
+          <p:cNvSpPr>
+            <a:spLocks noGrp="1"/>
+          </p:cNvSpPr>
+          <p:nvPr>
+            <p:ph sz="half" idx="2"/>
+          </p:nvPr>
+        </p:nvSpPr>
+        <p:spPr>
+          <a:xfrm>
+            <a:off x="6894714" y="1853248"/>
+            <a:ext cx="4396341" cy="4200245"/>
+          </a:xfrm>
+        </p:spPr>
+        <p:txBody>
+          <a:bodyPr>
+            <a:normAutofit lnSpcReduction="10000"/>
+          </a:bodyPr>
+          <a:lstStyle/>
+          <a:p>
+            <a:r>
+              <a:rPr lang="en-US" sz="2000" dirty="0" smtClean="0"/>
+              <a:t>What can they do better?</a:t>
+            </a:r>
+          </a:p>
+          <a:p>
+            <a:pPr lvl="1"/>
+            <a:r>
+              <a:rPr lang="en-US" sz="2000" dirty="0" smtClean="0"/>
+              <a:t>Improvement space for styling</a:t>
+            </a:r>
+          </a:p>
+          <a:p>
+            <a:pPr lvl="1"/>
+            <a:r>
+              <a:rPr lang="en-US" sz="2000" dirty="0" smtClean="0"/>
+              <a:t>Models take a long time to load</a:t>
+            </a:r>
+            <a:endParaRPr lang="en-US" sz="2000" dirty="0"/>
+          </a:p>
+          <a:p>
+            <a:endParaRPr lang="en-US" sz="2000" dirty="0"/>
+          </a:p>
+          <a:p>
+            <a:r>
+              <a:rPr lang="en-US" sz="2000" dirty="0" smtClean="0"/>
+              <a:t>What puzzles us about their website?</a:t>
+            </a:r>
+          </a:p>
+          <a:p>
+            <a:pPr lvl="1"/>
+            <a:r>
+              <a:rPr lang="en-US" sz="2000" dirty="0" smtClean="0"/>
+              <a:t>Why is it so slow 🤔</a:t>
+            </a:r>
+          </a:p>
+          <a:p>
+            <a:pPr lvl="1"/>
+            <a:r>
+              <a:rPr lang="en-US" sz="2000" dirty="0" smtClean="0"/>
+              <a:t>Website is down when we access it sometimes</a:t>
+            </a:r>
+          </a:p>
+        </p:txBody>
+      </p:sp>
+    </p:spTree>
+    <p:extLst>
+      <p:ext uri="{BB962C8B-B14F-4D97-AF65-F5344CB8AC3E}">
+        <p14:creationId xmlns:p14="http://schemas.microsoft.com/office/powerpoint/2010/main" val="428548812"/>
+      </p:ext>
+    </p:extLst>
+  </p:cSld>
+  <p:clrMapOvr>
+    <a:masterClrMapping/>
+  </p:clrMapOvr>
+  <p:timing>
+    <p:tnLst>
+      <p:par>
+        <p:cTn id="1" dur="indefinite" restart="never" nodeType="tmRoot"/>
+      </p:par>
+    </p:tnLst>
+  </p:timing>
+</p:sld>
+</file>
+
+<file path=ppt/slides/slide9.xml><?xml version="1.0" encoding="utf-8"?>
 <p:sld xmlns:a="http://schemas.openxmlformats.org/drawingml/2006/main" xmlns:r="http://schemas.openxmlformats.org/officeDocument/2006/relationships" xmlns:p="http://schemas.openxmlformats.org/presentationml/2006/main">
   <p:cSld>
     <p:spTree>

</xml_diff>